<commit_message>
se sube ppt modificado de Presentación-Grupo 2-Proyecto IOT 1 y 2
</commit_message>
<xml_diff>
--- a/TP6/D presentacion/Presentacion -Grupo 2 -Proyecto 1_DHT11_ESP32_FINAL.pptx
+++ b/TP6/D presentacion/Presentacion -Grupo 2 -Proyecto 1_DHT11_ESP32_FINAL.pptx
@@ -204,7 +204,7 @@
             <a:fld id="{683F8DC8-54CD-4EDC-BFA5-5CD70B4BF4FE}" type="datetimeFigureOut">
               <a:rPr lang="es-ES" smtClean="0"/>
               <a:pPr/>
-              <a:t>04/05/2025</a:t>
+              <a:t>05/05/2025</a:t>
             </a:fld>
             <a:endParaRPr lang="es-ES"/>
           </a:p>
@@ -734,7 +734,7 @@
             <a:fld id="{5BCAD085-E8A6-8845-BD4E-CB4CCA059FC4}" type="datetimeFigureOut">
               <a:rPr lang="en-US" smtClean="0"/>
               <a:pPr/>
-              <a:t>5/4/2025</a:t>
+              <a:t>5/5/2025</a:t>
             </a:fld>
             <a:endParaRPr lang="en-US"/>
           </a:p>
@@ -786,7 +786,7 @@
     </p:spTree>
     <p:extLst>
       <p:ext uri="{BB962C8B-B14F-4D97-AF65-F5344CB8AC3E}">
-        <p14:creationId xmlns="" xmlns:p14="http://schemas.microsoft.com/office/powerpoint/2010/main" val="3168075583"/>
+        <p14:creationId xmlns:p14="http://schemas.microsoft.com/office/powerpoint/2010/main" xmlns="" val="3168075583"/>
       </p:ext>
     </p:extLst>
   </p:cSld>
@@ -906,7 +906,7 @@
             <a:fld id="{5BCAD085-E8A6-8845-BD4E-CB4CCA059FC4}" type="datetimeFigureOut">
               <a:rPr lang="en-US" smtClean="0"/>
               <a:pPr/>
-              <a:t>5/4/2025</a:t>
+              <a:t>5/5/2025</a:t>
             </a:fld>
             <a:endParaRPr lang="en-US"/>
           </a:p>
@@ -958,7 +958,7 @@
     </p:spTree>
     <p:extLst>
       <p:ext uri="{BB962C8B-B14F-4D97-AF65-F5344CB8AC3E}">
-        <p14:creationId xmlns="" xmlns:p14="http://schemas.microsoft.com/office/powerpoint/2010/main" val="2910927964"/>
+        <p14:creationId xmlns:p14="http://schemas.microsoft.com/office/powerpoint/2010/main" xmlns="" val="2910927964"/>
       </p:ext>
     </p:extLst>
   </p:cSld>
@@ -1088,7 +1088,7 @@
             <a:fld id="{5BCAD085-E8A6-8845-BD4E-CB4CCA059FC4}" type="datetimeFigureOut">
               <a:rPr lang="en-US" smtClean="0"/>
               <a:pPr/>
-              <a:t>5/4/2025</a:t>
+              <a:t>5/5/2025</a:t>
             </a:fld>
             <a:endParaRPr lang="en-US"/>
           </a:p>
@@ -1140,7 +1140,7 @@
     </p:spTree>
     <p:extLst>
       <p:ext uri="{BB962C8B-B14F-4D97-AF65-F5344CB8AC3E}">
-        <p14:creationId xmlns="" xmlns:p14="http://schemas.microsoft.com/office/powerpoint/2010/main" val="3612223792"/>
+        <p14:creationId xmlns:p14="http://schemas.microsoft.com/office/powerpoint/2010/main" xmlns="" val="3612223792"/>
       </p:ext>
     </p:extLst>
   </p:cSld>
@@ -1260,7 +1260,7 @@
             <a:fld id="{5BCAD085-E8A6-8845-BD4E-CB4CCA059FC4}" type="datetimeFigureOut">
               <a:rPr lang="en-US" smtClean="0"/>
               <a:pPr/>
-              <a:t>5/4/2025</a:t>
+              <a:t>5/5/2025</a:t>
             </a:fld>
             <a:endParaRPr lang="en-US"/>
           </a:p>
@@ -1312,7 +1312,7 @@
     </p:spTree>
     <p:extLst>
       <p:ext uri="{BB962C8B-B14F-4D97-AF65-F5344CB8AC3E}">
-        <p14:creationId xmlns="" xmlns:p14="http://schemas.microsoft.com/office/powerpoint/2010/main" val="2614314258"/>
+        <p14:creationId xmlns:p14="http://schemas.microsoft.com/office/powerpoint/2010/main" xmlns="" val="2614314258"/>
       </p:ext>
     </p:extLst>
   </p:cSld>
@@ -1508,7 +1508,7 @@
             <a:fld id="{5BCAD085-E8A6-8845-BD4E-CB4CCA059FC4}" type="datetimeFigureOut">
               <a:rPr lang="en-US" smtClean="0"/>
               <a:pPr/>
-              <a:t>5/4/2025</a:t>
+              <a:t>5/5/2025</a:t>
             </a:fld>
             <a:endParaRPr lang="en-US"/>
           </a:p>
@@ -1560,7 +1560,7 @@
     </p:spTree>
     <p:extLst>
       <p:ext uri="{BB962C8B-B14F-4D97-AF65-F5344CB8AC3E}">
-        <p14:creationId xmlns="" xmlns:p14="http://schemas.microsoft.com/office/powerpoint/2010/main" val="960648375"/>
+        <p14:creationId xmlns:p14="http://schemas.microsoft.com/office/powerpoint/2010/main" xmlns="" val="960648375"/>
       </p:ext>
     </p:extLst>
   </p:cSld>
@@ -1798,7 +1798,7 @@
             <a:fld id="{5BCAD085-E8A6-8845-BD4E-CB4CCA059FC4}" type="datetimeFigureOut">
               <a:rPr lang="en-US" smtClean="0"/>
               <a:pPr/>
-              <a:t>5/4/2025</a:t>
+              <a:t>5/5/2025</a:t>
             </a:fld>
             <a:endParaRPr lang="en-US"/>
           </a:p>
@@ -1850,7 +1850,7 @@
     </p:spTree>
     <p:extLst>
       <p:ext uri="{BB962C8B-B14F-4D97-AF65-F5344CB8AC3E}">
-        <p14:creationId xmlns="" xmlns:p14="http://schemas.microsoft.com/office/powerpoint/2010/main" val="2782244947"/>
+        <p14:creationId xmlns:p14="http://schemas.microsoft.com/office/powerpoint/2010/main" xmlns="" val="2782244947"/>
       </p:ext>
     </p:extLst>
   </p:cSld>
@@ -2222,7 +2222,7 @@
             <a:fld id="{5BCAD085-E8A6-8845-BD4E-CB4CCA059FC4}" type="datetimeFigureOut">
               <a:rPr lang="en-US" smtClean="0"/>
               <a:pPr/>
-              <a:t>5/4/2025</a:t>
+              <a:t>5/5/2025</a:t>
             </a:fld>
             <a:endParaRPr lang="en-US"/>
           </a:p>
@@ -2274,7 +2274,7 @@
     </p:spTree>
     <p:extLst>
       <p:ext uri="{BB962C8B-B14F-4D97-AF65-F5344CB8AC3E}">
-        <p14:creationId xmlns="" xmlns:p14="http://schemas.microsoft.com/office/powerpoint/2010/main" val="990158736"/>
+        <p14:creationId xmlns:p14="http://schemas.microsoft.com/office/powerpoint/2010/main" xmlns="" val="990158736"/>
       </p:ext>
     </p:extLst>
   </p:cSld>
@@ -2342,7 +2342,7 @@
             <a:fld id="{5BCAD085-E8A6-8845-BD4E-CB4CCA059FC4}" type="datetimeFigureOut">
               <a:rPr lang="en-US" smtClean="0"/>
               <a:pPr/>
-              <a:t>5/4/2025</a:t>
+              <a:t>5/5/2025</a:t>
             </a:fld>
             <a:endParaRPr lang="en-US"/>
           </a:p>
@@ -2394,7 +2394,7 @@
     </p:spTree>
     <p:extLst>
       <p:ext uri="{BB962C8B-B14F-4D97-AF65-F5344CB8AC3E}">
-        <p14:creationId xmlns="" xmlns:p14="http://schemas.microsoft.com/office/powerpoint/2010/main" val="727027711"/>
+        <p14:creationId xmlns:p14="http://schemas.microsoft.com/office/powerpoint/2010/main" xmlns="" val="727027711"/>
       </p:ext>
     </p:extLst>
   </p:cSld>
@@ -2439,7 +2439,7 @@
             <a:fld id="{5BCAD085-E8A6-8845-BD4E-CB4CCA059FC4}" type="datetimeFigureOut">
               <a:rPr lang="en-US" smtClean="0"/>
               <a:pPr/>
-              <a:t>5/4/2025</a:t>
+              <a:t>5/5/2025</a:t>
             </a:fld>
             <a:endParaRPr lang="en-US"/>
           </a:p>
@@ -2491,7 +2491,7 @@
     </p:spTree>
     <p:extLst>
       <p:ext uri="{BB962C8B-B14F-4D97-AF65-F5344CB8AC3E}">
-        <p14:creationId xmlns="" xmlns:p14="http://schemas.microsoft.com/office/powerpoint/2010/main" val="1212999818"/>
+        <p14:creationId xmlns:p14="http://schemas.microsoft.com/office/powerpoint/2010/main" xmlns="" val="1212999818"/>
       </p:ext>
     </p:extLst>
   </p:cSld>
@@ -2718,7 +2718,7 @@
             <a:fld id="{5BCAD085-E8A6-8845-BD4E-CB4CCA059FC4}" type="datetimeFigureOut">
               <a:rPr lang="en-US" smtClean="0"/>
               <a:pPr/>
-              <a:t>5/4/2025</a:t>
+              <a:t>5/5/2025</a:t>
             </a:fld>
             <a:endParaRPr lang="en-US"/>
           </a:p>
@@ -2770,7 +2770,7 @@
     </p:spTree>
     <p:extLst>
       <p:ext uri="{BB962C8B-B14F-4D97-AF65-F5344CB8AC3E}">
-        <p14:creationId xmlns="" xmlns:p14="http://schemas.microsoft.com/office/powerpoint/2010/main" val="1840726560"/>
+        <p14:creationId xmlns:p14="http://schemas.microsoft.com/office/powerpoint/2010/main" xmlns="" val="1840726560"/>
       </p:ext>
     </p:extLst>
   </p:cSld>
@@ -2973,7 +2973,7 @@
             <a:fld id="{5BCAD085-E8A6-8845-BD4E-CB4CCA059FC4}" type="datetimeFigureOut">
               <a:rPr lang="en-US" smtClean="0"/>
               <a:pPr/>
-              <a:t>5/4/2025</a:t>
+              <a:t>5/5/2025</a:t>
             </a:fld>
             <a:endParaRPr lang="en-US"/>
           </a:p>
@@ -3025,7 +3025,7 @@
     </p:spTree>
     <p:extLst>
       <p:ext uri="{BB962C8B-B14F-4D97-AF65-F5344CB8AC3E}">
-        <p14:creationId xmlns="" xmlns:p14="http://schemas.microsoft.com/office/powerpoint/2010/main" val="3889236939"/>
+        <p14:creationId xmlns:p14="http://schemas.microsoft.com/office/powerpoint/2010/main" xmlns="" val="3889236939"/>
       </p:ext>
     </p:extLst>
   </p:cSld>
@@ -3193,7 +3193,7 @@
             <a:fld id="{5BCAD085-E8A6-8845-BD4E-CB4CCA059FC4}" type="datetimeFigureOut">
               <a:rPr lang="en-US" smtClean="0"/>
               <a:pPr/>
-              <a:t>5/4/2025</a:t>
+              <a:t>5/5/2025</a:t>
             </a:fld>
             <a:endParaRPr lang="en-US"/>
           </a:p>
@@ -3281,7 +3281,7 @@
     </p:spTree>
     <p:extLst>
       <p:ext uri="{BB962C8B-B14F-4D97-AF65-F5344CB8AC3E}">
-        <p14:creationId xmlns="" xmlns:p14="http://schemas.microsoft.com/office/powerpoint/2010/main" val="2209977519"/>
+        <p14:creationId xmlns:p14="http://schemas.microsoft.com/office/powerpoint/2010/main" xmlns="" val="2209977519"/>
       </p:ext>
     </p:extLst>
   </p:cSld>
@@ -3765,27 +3765,12 @@
           <a:lstStyle/>
           <a:p>
             <a:r>
-              <a:t>Conexión ESP32 </a:t>
-            </a:r>
-            <a:r>
               <a:rPr/>
-              <a:t>+ </a:t>
-            </a:r>
-            <a:r>
-              <a:rPr lang="es-MX" dirty="0" smtClean="0"/>
-              <a:t>sensor </a:t>
-            </a:r>
-            <a:r>
-              <a:rPr smtClean="0"/>
-              <a:t>DHT11</a:t>
-            </a:r>
-            <a:r>
-              <a:rPr lang="es-MX" dirty="0" smtClean="0"/>
-              <a:t>(1)</a:t>
-            </a:r>
-            <a:r>
-              <a:rPr smtClean="0"/>
-              <a:t> </a:t>
+              <a:t>Conexión </a:t>
+            </a:r>
+            <a:r>
+              <a:rPr lang="es-ES" smtClean="0"/>
+              <a:t>Serial Bluetooth Terminal</a:t>
             </a:r>
             <a:endParaRPr/>
           </a:p>
@@ -4059,15 +4044,7 @@
             </a:r>
             <a:r>
               <a:rPr lang="es-ES" dirty="0" smtClean="0"/>
-              <a:t>onitorea las variables de temperatura </a:t>
-            </a:r>
-            <a:r>
-              <a:rPr lang="es-ES" dirty="0" smtClean="0"/>
-              <a:t>y humedad </a:t>
-            </a:r>
-            <a:r>
-              <a:rPr lang="es-ES" dirty="0" smtClean="0"/>
-              <a:t>usando </a:t>
+              <a:t>onitorea las variables de temperatura y humedad usando </a:t>
             </a:r>
             <a:r>
               <a:rPr lang="es-MX" dirty="0" smtClean="0"/>
@@ -4075,19 +4052,7 @@
             </a:r>
             <a:r>
               <a:rPr lang="es-ES" dirty="0" smtClean="0"/>
-              <a:t> </a:t>
-            </a:r>
-            <a:r>
-              <a:rPr lang="es-ES" dirty="0" smtClean="0"/>
-              <a:t>ESP32 y un sensor </a:t>
-            </a:r>
-            <a:r>
-              <a:rPr lang="es-ES" dirty="0" smtClean="0"/>
-              <a:t>DHT11, </a:t>
-            </a:r>
-            <a:r>
-              <a:rPr lang="es-ES" dirty="0" smtClean="0"/>
-              <a:t>comunicando los datos a un Smartphone o PC vía </a:t>
+              <a:t> ESP32 y un sensor DHT11, comunicando los datos a un Smartphone o PC vía </a:t>
             </a:r>
             <a:r>
               <a:rPr lang="es-ES" b="1" dirty="0" smtClean="0"/>
@@ -4117,11 +4082,7 @@
             </a:r>
             <a:r>
               <a:rPr lang="es-MX" dirty="0" smtClean="0"/>
-              <a:t>l </a:t>
-            </a:r>
-            <a:r>
-              <a:rPr lang="es-MX" dirty="0" smtClean="0"/>
-              <a:t>microcontrolador</a:t>
+              <a:t>l microcontrolador</a:t>
             </a:r>
             <a:r>
               <a:rPr smtClean="0"/>
@@ -4277,11 +4238,7 @@
             </a:r>
             <a:r>
               <a:rPr sz="2800" smtClean="0"/>
-              <a:t>ESP32</a:t>
-            </a:r>
-            <a:r>
-              <a:rPr sz="2800" smtClean="0"/>
-              <a:t>)</a:t>
+              <a:t>ESP32)</a:t>
             </a:r>
             <a:endParaRPr lang="es-MX" sz="2800" dirty="0" smtClean="0"/>
           </a:p>
@@ -4291,11 +4248,7 @@
             </a:pPr>
             <a:r>
               <a:rPr lang="es-MX" sz="2800" dirty="0" smtClean="0"/>
-              <a:t> </a:t>
-            </a:r>
-            <a:r>
-              <a:rPr lang="es-MX" sz="2800" dirty="0" smtClean="0"/>
-              <a:t>    (</a:t>
+              <a:t>     (</a:t>
             </a:r>
             <a:r>
               <a:rPr lang="es-ES" sz="2800" dirty="0" smtClean="0"/>
@@ -4309,7 +4262,6 @@
               <a:rPr lang="es-MX" sz="2800" dirty="0" smtClean="0"/>
               <a:t>)</a:t>
             </a:r>
-            <a:endParaRPr lang="es-MX" sz="2800" dirty="0" smtClean="0"/>
           </a:p>
           <a:p>
             <a:pPr>
@@ -4701,11 +4653,7 @@
             <a:pPr lvl="0"/>
             <a:r>
               <a:rPr lang="es-ES" dirty="0" smtClean="0"/>
-              <a:t>Envía datos vía Bluetooth al dispositivo </a:t>
-            </a:r>
-            <a:r>
-              <a:rPr lang="es-ES" dirty="0" smtClean="0"/>
-              <a:t>emparejado.</a:t>
+              <a:t>Envía datos vía Bluetooth al dispositivo emparejado.</a:t>
             </a:r>
             <a:endParaRPr/>
           </a:p>

</xml_diff>